<commit_message>
updated ppp to less than 10 pages
</commit_message>
<xml_diff>
--- a/docs/diagrams/SummaryComponentClassDiagram.pptx
+++ b/docs/diagrams/SummaryComponentClassDiagram.pptx
@@ -4801,10 +4801,10 @@
       </p:grpSpPr>
       <p:grpSp>
         <p:nvGrpSpPr>
-          <p:cNvPr id="7" name="Group 6">
+          <p:cNvPr id="58" name="Group 57">
             <a:extLst>
               <a:ext uri="{FF2B5EF4-FFF2-40B4-BE49-F238E27FC236}">
-                <a16:creationId xmlns:a16="http://schemas.microsoft.com/office/drawing/2014/main" id="{B8E710A4-E3B2-4C1C-BD7B-7DF9A6D5C322}"/>
+                <a16:creationId xmlns:a16="http://schemas.microsoft.com/office/drawing/2014/main" id="{C50D9E85-8495-4FDD-8C30-B0A2CCBA328E}"/>
               </a:ext>
             </a:extLst>
           </p:cNvPr>
@@ -4813,10 +4813,10 @@
         </p:nvGrpSpPr>
         <p:grpSpPr>
           <a:xfrm>
-            <a:off x="1951508" y="1169538"/>
-            <a:ext cx="3306291" cy="2259462"/>
-            <a:chOff x="1951508" y="1169538"/>
-            <a:chExt cx="5088071" cy="3296582"/>
+            <a:off x="277389" y="1967869"/>
+            <a:ext cx="5608242" cy="1726062"/>
+            <a:chOff x="277389" y="1967869"/>
+            <a:chExt cx="5608242" cy="1726062"/>
           </a:xfrm>
         </p:grpSpPr>
         <p:sp>
@@ -4833,8 +4833,8 @@
           </p:nvSpPr>
           <p:spPr>
             <a:xfrm flipH="1">
-              <a:off x="1981179" y="3533090"/>
-              <a:ext cx="1341929" cy="933030"/>
+              <a:off x="2069867" y="3205405"/>
+              <a:ext cx="711226" cy="488526"/>
             </a:xfrm>
             <a:prstGeom prst="rect">
               <a:avLst/>
@@ -4865,14 +4865,25 @@
             <a:p>
               <a:pPr algn="ctr"/>
               <a:r>
-                <a:rPr lang="en-US" sz="1050" b="1" dirty="0" err="1">
+                <a:rPr lang="en-US" sz="900" b="1" dirty="0">
                   <a:solidFill>
                     <a:schemeClr val="bg1"/>
                   </a:solidFill>
                 </a:rPr>
-                <a:t>SummaryByDate</a:t>
+                <a:t>Summary</a:t>
               </a:r>
-              <a:endParaRPr lang="en-US" sz="1050" b="1" dirty="0">
+            </a:p>
+            <a:p>
+              <a:pPr algn="ctr"/>
+              <a:r>
+                <a:rPr lang="en-US" sz="900" b="1" dirty="0" err="1">
+                  <a:solidFill>
+                    <a:schemeClr val="bg1"/>
+                  </a:solidFill>
+                </a:rPr>
+                <a:t>ByDate</a:t>
+              </a:r>
+              <a:endParaRPr lang="en-US" sz="900" b="1" dirty="0">
                 <a:solidFill>
                   <a:schemeClr val="bg1"/>
                 </a:solidFill>
@@ -4881,14 +4892,14 @@
             <a:p>
               <a:pPr algn="ctr"/>
               <a:r>
-                <a:rPr lang="en-US" sz="1050" b="1" dirty="0">
+                <a:rPr lang="en-US" sz="900" b="1" dirty="0">
                   <a:solidFill>
                     <a:schemeClr val="bg1"/>
                   </a:solidFill>
                 </a:rPr>
                 <a:t>Command</a:t>
               </a:r>
-              <a:endParaRPr lang="en-SG" sz="1050" b="1" dirty="0">
+              <a:endParaRPr lang="en-SG" sz="900" b="1" dirty="0">
                 <a:solidFill>
                   <a:schemeClr val="bg1"/>
                 </a:solidFill>
@@ -4910,8 +4921,8 @@
           </p:nvSpPr>
           <p:spPr>
             <a:xfrm flipH="1">
-              <a:off x="1951508" y="2351314"/>
-              <a:ext cx="1371600" cy="933030"/>
+              <a:off x="2054141" y="2586637"/>
+              <a:ext cx="726952" cy="488526"/>
             </a:xfrm>
             <a:prstGeom prst="rect">
               <a:avLst/>
@@ -4942,14 +4953,25 @@
             <a:p>
               <a:pPr algn="ctr"/>
               <a:r>
-                <a:rPr lang="en-US" sz="1050" b="1" dirty="0" err="1">
+                <a:rPr lang="en-US" sz="900" b="1" dirty="0">
                   <a:solidFill>
                     <a:schemeClr val="bg1"/>
                   </a:solidFill>
                 </a:rPr>
-                <a:t>SummaryByMonth</a:t>
+                <a:t>Summary</a:t>
               </a:r>
-              <a:endParaRPr lang="en-US" sz="1050" b="1" dirty="0">
+            </a:p>
+            <a:p>
+              <a:pPr algn="ctr"/>
+              <a:r>
+                <a:rPr lang="en-US" sz="900" b="1" dirty="0" err="1">
+                  <a:solidFill>
+                    <a:schemeClr val="bg1"/>
+                  </a:solidFill>
+                </a:rPr>
+                <a:t>ByMonth</a:t>
+              </a:r>
+              <a:endParaRPr lang="en-US" sz="900" b="1" dirty="0">
                 <a:solidFill>
                   <a:schemeClr val="bg1"/>
                 </a:solidFill>
@@ -4958,14 +4980,14 @@
             <a:p>
               <a:pPr algn="ctr"/>
               <a:r>
-                <a:rPr lang="en-US" sz="1050" b="1" dirty="0">
+                <a:rPr lang="en-US" sz="900" b="1" dirty="0">
                   <a:solidFill>
                     <a:schemeClr val="bg1"/>
                   </a:solidFill>
                 </a:rPr>
                 <a:t>Command</a:t>
               </a:r>
-              <a:endParaRPr lang="en-SG" sz="1050" b="1" dirty="0">
+              <a:endParaRPr lang="en-SG" sz="900" b="1" dirty="0">
                 <a:solidFill>
                   <a:schemeClr val="bg1"/>
                 </a:solidFill>
@@ -4987,8 +5009,8 @@
           </p:nvSpPr>
           <p:spPr>
             <a:xfrm flipH="1">
-              <a:off x="4876799" y="2351314"/>
-              <a:ext cx="2162780" cy="933029"/>
+              <a:off x="277389" y="2580563"/>
+              <a:ext cx="1146280" cy="488526"/>
             </a:xfrm>
             <a:prstGeom prst="rect">
               <a:avLst/>
@@ -5019,7 +5041,7 @@
             <a:p>
               <a:pPr algn="ctr"/>
               <a:r>
-                <a:rPr lang="en-US" sz="1050" b="1" dirty="0">
+                <a:rPr lang="en-US" sz="900" b="1" dirty="0">
                   <a:solidFill>
                     <a:schemeClr val="bg1"/>
                   </a:solidFill>
@@ -5030,14 +5052,14 @@
             <a:p>
               <a:pPr algn="ctr"/>
               <a:r>
-                <a:rPr lang="en-US" sz="1050" b="1" dirty="0" err="1">
+                <a:rPr lang="en-US" sz="900" b="1" dirty="0" err="1">
                   <a:solidFill>
                     <a:schemeClr val="bg1"/>
                   </a:solidFill>
                 </a:rPr>
                 <a:t>SummaryCommand</a:t>
               </a:r>
-              <a:endParaRPr lang="en-SG" sz="1050" b="1" dirty="0">
+              <a:endParaRPr lang="en-SG" sz="900" b="1" dirty="0">
                 <a:solidFill>
                   <a:schemeClr val="bg1"/>
                 </a:solidFill>
@@ -5059,8 +5081,8 @@
           </p:nvSpPr>
           <p:spPr>
             <a:xfrm flipH="1">
-              <a:off x="1951508" y="1169538"/>
-              <a:ext cx="1371600" cy="933030"/>
+              <a:off x="2054141" y="1967869"/>
+              <a:ext cx="726952" cy="488526"/>
             </a:xfrm>
             <a:prstGeom prst="rect">
               <a:avLst/>
@@ -5091,14 +5113,25 @@
             <a:p>
               <a:pPr algn="ctr"/>
               <a:r>
-                <a:rPr lang="en-US" sz="1050" b="1" dirty="0" err="1">
+                <a:rPr lang="en-US" sz="900" b="1" dirty="0">
                   <a:solidFill>
                     <a:schemeClr val="bg1"/>
                   </a:solidFill>
                 </a:rPr>
-                <a:t>SummaryByCategory</a:t>
+                <a:t>Summary</a:t>
               </a:r>
-              <a:endParaRPr lang="en-US" sz="1050" b="1" dirty="0">
+            </a:p>
+            <a:p>
+              <a:pPr algn="ctr"/>
+              <a:r>
+                <a:rPr lang="en-US" sz="900" b="1" dirty="0" err="1">
+                  <a:solidFill>
+                    <a:schemeClr val="bg1"/>
+                  </a:solidFill>
+                </a:rPr>
+                <a:t>ByCategory</a:t>
+              </a:r>
+              <a:endParaRPr lang="en-US" sz="900" b="1" dirty="0">
                 <a:solidFill>
                   <a:schemeClr val="bg1"/>
                 </a:solidFill>
@@ -5107,14 +5140,14 @@
             <a:p>
               <a:pPr algn="ctr"/>
               <a:r>
-                <a:rPr lang="en-US" sz="1050" b="1" dirty="0">
+                <a:rPr lang="en-US" sz="900" b="1" dirty="0">
                   <a:solidFill>
                     <a:schemeClr val="bg1"/>
                   </a:solidFill>
                 </a:rPr>
                 <a:t>Command</a:t>
               </a:r>
-              <a:endParaRPr lang="en-SG" sz="1050" b="1" dirty="0">
+              <a:endParaRPr lang="en-SG" sz="900" b="1" dirty="0">
                 <a:solidFill>
                   <a:schemeClr val="bg1"/>
                 </a:solidFill>
@@ -5122,6 +5155,646 @@
             </a:p>
           </p:txBody>
         </p:sp>
+        <p:cxnSp>
+          <p:nvCxnSpPr>
+            <p:cNvPr id="11" name="Straight Connector 10">
+              <a:extLst>
+                <a:ext uri="{FF2B5EF4-FFF2-40B4-BE49-F238E27FC236}">
+                  <a16:creationId xmlns:a16="http://schemas.microsoft.com/office/drawing/2014/main" id="{3921B34D-4A5C-4B92-BB8F-57495445DE15}"/>
+                </a:ext>
+              </a:extLst>
+            </p:cNvPr>
+            <p:cNvCxnSpPr>
+              <a:cxnSpLocks/>
+              <a:stCxn id="5" idx="3"/>
+              <a:endCxn id="4" idx="1"/>
+            </p:cNvCxnSpPr>
+            <p:nvPr/>
+          </p:nvCxnSpPr>
+          <p:spPr>
+            <a:xfrm rot="10800000" flipV="1">
+              <a:off x="1423669" y="2212132"/>
+              <a:ext cx="630472" cy="612694"/>
+            </a:xfrm>
+            <a:prstGeom prst="bentConnector3">
+              <a:avLst>
+                <a:gd name="adj1" fmla="val 50000"/>
+              </a:avLst>
+            </a:prstGeom>
+            <a:ln w="19050"/>
+          </p:spPr>
+          <p:style>
+            <a:lnRef idx="1">
+              <a:schemeClr val="accent1"/>
+            </a:lnRef>
+            <a:fillRef idx="0">
+              <a:schemeClr val="accent1"/>
+            </a:fillRef>
+            <a:effectRef idx="0">
+              <a:schemeClr val="accent1"/>
+            </a:effectRef>
+            <a:fontRef idx="minor">
+              <a:schemeClr val="tx1"/>
+            </a:fontRef>
+          </p:style>
+        </p:cxnSp>
+        <p:cxnSp>
+          <p:nvCxnSpPr>
+            <p:cNvPr id="12" name="Straight Connector 10">
+              <a:extLst>
+                <a:ext uri="{FF2B5EF4-FFF2-40B4-BE49-F238E27FC236}">
+                  <a16:creationId xmlns:a16="http://schemas.microsoft.com/office/drawing/2014/main" id="{FAA039DF-F584-4EE8-A3AB-30481A79C857}"/>
+                </a:ext>
+              </a:extLst>
+            </p:cNvPr>
+            <p:cNvCxnSpPr>
+              <a:cxnSpLocks/>
+              <a:stCxn id="3" idx="3"/>
+              <a:endCxn id="4" idx="1"/>
+            </p:cNvCxnSpPr>
+            <p:nvPr/>
+          </p:nvCxnSpPr>
+          <p:spPr>
+            <a:xfrm rot="10800000">
+              <a:off x="1423669" y="2824826"/>
+              <a:ext cx="630472" cy="6074"/>
+            </a:xfrm>
+            <a:prstGeom prst="bentConnector3">
+              <a:avLst>
+                <a:gd name="adj1" fmla="val 50000"/>
+              </a:avLst>
+            </a:prstGeom>
+            <a:ln w="19050"/>
+          </p:spPr>
+          <p:style>
+            <a:lnRef idx="1">
+              <a:schemeClr val="accent1"/>
+            </a:lnRef>
+            <a:fillRef idx="0">
+              <a:schemeClr val="accent1"/>
+            </a:fillRef>
+            <a:effectRef idx="0">
+              <a:schemeClr val="accent1"/>
+            </a:effectRef>
+            <a:fontRef idx="minor">
+              <a:schemeClr val="tx1"/>
+            </a:fontRef>
+          </p:style>
+        </p:cxnSp>
+        <p:sp>
+          <p:nvSpPr>
+            <p:cNvPr id="14" name="Rectangle 13">
+              <a:extLst>
+                <a:ext uri="{FF2B5EF4-FFF2-40B4-BE49-F238E27FC236}">
+                  <a16:creationId xmlns:a16="http://schemas.microsoft.com/office/drawing/2014/main" id="{9E1E1122-13D7-42A7-858E-DB3D9DC14359}"/>
+                </a:ext>
+              </a:extLst>
+            </p:cNvPr>
+            <p:cNvSpPr/>
+            <p:nvPr/>
+          </p:nvSpPr>
+          <p:spPr>
+            <a:xfrm flipH="1">
+              <a:off x="3400313" y="3205405"/>
+              <a:ext cx="767971" cy="488526"/>
+            </a:xfrm>
+            <a:prstGeom prst="rect">
+              <a:avLst/>
+            </a:prstGeom>
+            <a:solidFill>
+              <a:srgbClr val="4BACC6"/>
+            </a:solidFill>
+            <a:ln/>
+            <a:effectLst/>
+          </p:spPr>
+          <p:style>
+            <a:lnRef idx="1">
+              <a:schemeClr val="accent5"/>
+            </a:lnRef>
+            <a:fillRef idx="2">
+              <a:schemeClr val="accent5"/>
+            </a:fillRef>
+            <a:effectRef idx="1">
+              <a:schemeClr val="accent5"/>
+            </a:effectRef>
+            <a:fontRef idx="minor">
+              <a:schemeClr val="dk1"/>
+            </a:fontRef>
+          </p:style>
+          <p:txBody>
+            <a:bodyPr rtlCol="0" anchor="ctr"/>
+            <a:lstStyle/>
+            <a:p>
+              <a:pPr algn="ctr"/>
+              <a:r>
+                <a:rPr lang="en-US" sz="900" b="1" dirty="0" err="1">
+                  <a:solidFill>
+                    <a:srgbClr val="F2F9FB"/>
+                  </a:solidFill>
+                </a:rPr>
+                <a:t>SummaryBy</a:t>
+              </a:r>
+              <a:endParaRPr lang="en-US" sz="900" b="1" dirty="0">
+                <a:solidFill>
+                  <a:srgbClr val="F2F9FB"/>
+                </a:solidFill>
+              </a:endParaRPr>
+            </a:p>
+            <a:p>
+              <a:pPr algn="ctr"/>
+              <a:r>
+                <a:rPr lang="en-US" sz="900" b="1" dirty="0">
+                  <a:solidFill>
+                    <a:srgbClr val="F2F9FB"/>
+                  </a:solidFill>
+                </a:rPr>
+                <a:t>Date</a:t>
+              </a:r>
+            </a:p>
+            <a:p>
+              <a:pPr algn="ctr"/>
+              <a:r>
+                <a:rPr lang="en-US" sz="900" b="1" dirty="0">
+                  <a:solidFill>
+                    <a:srgbClr val="F2F9FB"/>
+                  </a:solidFill>
+                </a:rPr>
+                <a:t>List</a:t>
+              </a:r>
+              <a:endParaRPr lang="en-SG" sz="900" b="1" dirty="0">
+                <a:solidFill>
+                  <a:srgbClr val="F2F9FB"/>
+                </a:solidFill>
+              </a:endParaRPr>
+            </a:p>
+          </p:txBody>
+        </p:sp>
+        <p:sp>
+          <p:nvSpPr>
+            <p:cNvPr id="16" name="Rectangle 15">
+              <a:extLst>
+                <a:ext uri="{FF2B5EF4-FFF2-40B4-BE49-F238E27FC236}">
+                  <a16:creationId xmlns:a16="http://schemas.microsoft.com/office/drawing/2014/main" id="{2781F1D4-D70C-42F8-8A70-8EEAEEF58F81}"/>
+                </a:ext>
+              </a:extLst>
+            </p:cNvPr>
+            <p:cNvSpPr/>
+            <p:nvPr/>
+          </p:nvSpPr>
+          <p:spPr>
+            <a:xfrm flipH="1">
+              <a:off x="3401623" y="2592558"/>
+              <a:ext cx="784952" cy="488526"/>
+            </a:xfrm>
+            <a:prstGeom prst="rect">
+              <a:avLst/>
+            </a:prstGeom>
+            <a:solidFill>
+              <a:srgbClr val="4BACC6"/>
+            </a:solidFill>
+            <a:ln/>
+            <a:effectLst/>
+          </p:spPr>
+          <p:style>
+            <a:lnRef idx="1">
+              <a:schemeClr val="accent5"/>
+            </a:lnRef>
+            <a:fillRef idx="2">
+              <a:schemeClr val="accent5"/>
+            </a:fillRef>
+            <a:effectRef idx="1">
+              <a:schemeClr val="accent5"/>
+            </a:effectRef>
+            <a:fontRef idx="minor">
+              <a:schemeClr val="dk1"/>
+            </a:fontRef>
+          </p:style>
+          <p:txBody>
+            <a:bodyPr rtlCol="0" anchor="ctr"/>
+            <a:lstStyle/>
+            <a:p>
+              <a:pPr algn="ctr"/>
+              <a:r>
+                <a:rPr lang="en-US" sz="900" b="1" dirty="0" err="1">
+                  <a:solidFill>
+                    <a:srgbClr val="F2F9FB"/>
+                  </a:solidFill>
+                </a:rPr>
+                <a:t>SummaryByMonth</a:t>
+              </a:r>
+              <a:endParaRPr lang="en-US" sz="900" b="1" dirty="0">
+                <a:solidFill>
+                  <a:srgbClr val="F2F9FB"/>
+                </a:solidFill>
+              </a:endParaRPr>
+            </a:p>
+            <a:p>
+              <a:pPr algn="ctr"/>
+              <a:r>
+                <a:rPr lang="en-US" sz="900" b="1" dirty="0">
+                  <a:solidFill>
+                    <a:srgbClr val="F2F9FB"/>
+                  </a:solidFill>
+                </a:rPr>
+                <a:t>List</a:t>
+              </a:r>
+              <a:endParaRPr lang="en-SG" sz="900" b="1" dirty="0">
+                <a:solidFill>
+                  <a:srgbClr val="F2F9FB"/>
+                </a:solidFill>
+              </a:endParaRPr>
+            </a:p>
+          </p:txBody>
+        </p:sp>
+        <p:sp>
+          <p:nvSpPr>
+            <p:cNvPr id="17" name="Rectangle 16">
+              <a:extLst>
+                <a:ext uri="{FF2B5EF4-FFF2-40B4-BE49-F238E27FC236}">
+                  <a16:creationId xmlns:a16="http://schemas.microsoft.com/office/drawing/2014/main" id="{156FC2F7-E07A-414A-A3CD-FE6BB02815C8}"/>
+                </a:ext>
+              </a:extLst>
+            </p:cNvPr>
+            <p:cNvSpPr/>
+            <p:nvPr/>
+          </p:nvSpPr>
+          <p:spPr>
+            <a:xfrm flipH="1">
+              <a:off x="5041460" y="2612511"/>
+              <a:ext cx="844171" cy="423826"/>
+            </a:xfrm>
+            <a:prstGeom prst="rect">
+              <a:avLst/>
+            </a:prstGeom>
+            <a:solidFill>
+              <a:srgbClr val="4BACC6"/>
+            </a:solidFill>
+            <a:ln/>
+            <a:effectLst/>
+          </p:spPr>
+          <p:style>
+            <a:lnRef idx="1">
+              <a:schemeClr val="accent5"/>
+            </a:lnRef>
+            <a:fillRef idx="2">
+              <a:schemeClr val="accent5"/>
+            </a:fillRef>
+            <a:effectRef idx="1">
+              <a:schemeClr val="accent5"/>
+            </a:effectRef>
+            <a:fontRef idx="minor">
+              <a:schemeClr val="dk1"/>
+            </a:fontRef>
+          </p:style>
+          <p:txBody>
+            <a:bodyPr rtlCol="0" anchor="ctr"/>
+            <a:lstStyle/>
+            <a:p>
+              <a:pPr algn="ctr"/>
+              <a:r>
+                <a:rPr lang="en-US" sz="900" b="1" dirty="0">
+                  <a:solidFill>
+                    <a:srgbClr val="F2F9FB"/>
+                  </a:solidFill>
+                </a:rPr>
+                <a:t>{abstract}</a:t>
+              </a:r>
+            </a:p>
+            <a:p>
+              <a:pPr algn="ctr"/>
+              <a:r>
+                <a:rPr lang="en-US" sz="900" b="1" dirty="0" err="1">
+                  <a:solidFill>
+                    <a:srgbClr val="F2F9FB"/>
+                  </a:solidFill>
+                </a:rPr>
+                <a:t>SummaryList</a:t>
+              </a:r>
+              <a:endParaRPr lang="en-SG" sz="900" b="1" dirty="0">
+                <a:solidFill>
+                  <a:srgbClr val="F2F9FB"/>
+                </a:solidFill>
+              </a:endParaRPr>
+            </a:p>
+          </p:txBody>
+        </p:sp>
+        <p:sp>
+          <p:nvSpPr>
+            <p:cNvPr id="18" name="Rectangle 17">
+              <a:extLst>
+                <a:ext uri="{FF2B5EF4-FFF2-40B4-BE49-F238E27FC236}">
+                  <a16:creationId xmlns:a16="http://schemas.microsoft.com/office/drawing/2014/main" id="{F192BA27-EA4D-4E64-BEF4-5B4C9039E31F}"/>
+                </a:ext>
+              </a:extLst>
+            </p:cNvPr>
+            <p:cNvSpPr/>
+            <p:nvPr/>
+          </p:nvSpPr>
+          <p:spPr>
+            <a:xfrm flipH="1">
+              <a:off x="3400314" y="1967869"/>
+              <a:ext cx="784953" cy="488526"/>
+            </a:xfrm>
+            <a:prstGeom prst="rect">
+              <a:avLst/>
+            </a:prstGeom>
+            <a:solidFill>
+              <a:srgbClr val="4BACC6"/>
+            </a:solidFill>
+            <a:ln/>
+            <a:effectLst/>
+          </p:spPr>
+          <p:style>
+            <a:lnRef idx="1">
+              <a:schemeClr val="accent5"/>
+            </a:lnRef>
+            <a:fillRef idx="2">
+              <a:schemeClr val="accent5"/>
+            </a:fillRef>
+            <a:effectRef idx="1">
+              <a:schemeClr val="accent5"/>
+            </a:effectRef>
+            <a:fontRef idx="minor">
+              <a:schemeClr val="dk1"/>
+            </a:fontRef>
+          </p:style>
+          <p:txBody>
+            <a:bodyPr rtlCol="0" anchor="ctr"/>
+            <a:lstStyle/>
+            <a:p>
+              <a:pPr algn="ctr"/>
+              <a:r>
+                <a:rPr lang="en-US" sz="900" b="1" dirty="0" err="1">
+                  <a:solidFill>
+                    <a:srgbClr val="F2F9FB"/>
+                  </a:solidFill>
+                </a:rPr>
+                <a:t>SummaryBy</a:t>
+              </a:r>
+              <a:endParaRPr lang="en-US" sz="900" b="1" dirty="0">
+                <a:solidFill>
+                  <a:srgbClr val="F2F9FB"/>
+                </a:solidFill>
+              </a:endParaRPr>
+            </a:p>
+            <a:p>
+              <a:pPr algn="ctr"/>
+              <a:r>
+                <a:rPr lang="en-US" sz="900" b="1" dirty="0">
+                  <a:solidFill>
+                    <a:srgbClr val="F2F9FB"/>
+                  </a:solidFill>
+                </a:rPr>
+                <a:t>Category</a:t>
+              </a:r>
+            </a:p>
+            <a:p>
+              <a:pPr algn="ctr"/>
+              <a:r>
+                <a:rPr lang="en-US" sz="900" b="1" dirty="0">
+                  <a:solidFill>
+                    <a:srgbClr val="F2F9FB"/>
+                  </a:solidFill>
+                </a:rPr>
+                <a:t>List</a:t>
+              </a:r>
+              <a:endParaRPr lang="en-SG" sz="900" b="1" dirty="0">
+                <a:solidFill>
+                  <a:srgbClr val="F2F9FB"/>
+                </a:solidFill>
+              </a:endParaRPr>
+            </a:p>
+          </p:txBody>
+        </p:sp>
+        <p:sp>
+          <p:nvSpPr>
+            <p:cNvPr id="19" name="Isosceles Triangle 102">
+              <a:extLst>
+                <a:ext uri="{FF2B5EF4-FFF2-40B4-BE49-F238E27FC236}">
+                  <a16:creationId xmlns:a16="http://schemas.microsoft.com/office/drawing/2014/main" id="{7014D8A6-1986-41E7-8277-631ADF4335F6}"/>
+                </a:ext>
+              </a:extLst>
+            </p:cNvPr>
+            <p:cNvSpPr/>
+            <p:nvPr/>
+          </p:nvSpPr>
+          <p:spPr>
+            <a:xfrm rot="5400000" flipH="1">
+              <a:off x="4928774" y="2776741"/>
+              <a:ext cx="122876" cy="102496"/>
+            </a:xfrm>
+            <a:prstGeom prst="triangle">
+              <a:avLst/>
+            </a:prstGeom>
+            <a:solidFill>
+              <a:schemeClr val="accent5">
+                <a:lumMod val="60000"/>
+                <a:lumOff val="40000"/>
+              </a:schemeClr>
+            </a:solidFill>
+            <a:ln w="12700"/>
+          </p:spPr>
+          <p:style>
+            <a:lnRef idx="2">
+              <a:schemeClr val="accent5">
+                <a:shade val="50000"/>
+              </a:schemeClr>
+            </a:lnRef>
+            <a:fillRef idx="1">
+              <a:schemeClr val="accent5"/>
+            </a:fillRef>
+            <a:effectRef idx="0">
+              <a:schemeClr val="accent5"/>
+            </a:effectRef>
+            <a:fontRef idx="minor">
+              <a:schemeClr val="lt1"/>
+            </a:fontRef>
+          </p:style>
+          <p:txBody>
+            <a:bodyPr rtlCol="0" anchor="ctr"/>
+            <a:lstStyle/>
+            <a:p>
+              <a:pPr algn="ctr"/>
+              <a:endParaRPr lang="en-SG" sz="1050" b="1">
+                <a:solidFill>
+                  <a:schemeClr val="tx1"/>
+                </a:solidFill>
+              </a:endParaRPr>
+            </a:p>
+          </p:txBody>
+        </p:sp>
+        <p:cxnSp>
+          <p:nvCxnSpPr>
+            <p:cNvPr id="20" name="Straight Connector 10">
+              <a:extLst>
+                <a:ext uri="{FF2B5EF4-FFF2-40B4-BE49-F238E27FC236}">
+                  <a16:creationId xmlns:a16="http://schemas.microsoft.com/office/drawing/2014/main" id="{238C6B06-D6EB-4D00-9565-0C041718021E}"/>
+                </a:ext>
+              </a:extLst>
+            </p:cNvPr>
+            <p:cNvCxnSpPr>
+              <a:cxnSpLocks/>
+              <a:stCxn id="18" idx="1"/>
+              <a:endCxn id="19" idx="3"/>
+            </p:cNvCxnSpPr>
+            <p:nvPr/>
+          </p:nvCxnSpPr>
+          <p:spPr>
+            <a:xfrm>
+              <a:off x="4185267" y="2212132"/>
+              <a:ext cx="753697" cy="615857"/>
+            </a:xfrm>
+            <a:prstGeom prst="bentConnector3">
+              <a:avLst>
+                <a:gd name="adj1" fmla="val 50000"/>
+              </a:avLst>
+            </a:prstGeom>
+            <a:ln w="19050"/>
+          </p:spPr>
+          <p:style>
+            <a:lnRef idx="1">
+              <a:schemeClr val="accent1"/>
+            </a:lnRef>
+            <a:fillRef idx="0">
+              <a:schemeClr val="accent1"/>
+            </a:fillRef>
+            <a:effectRef idx="0">
+              <a:schemeClr val="accent1"/>
+            </a:effectRef>
+            <a:fontRef idx="minor">
+              <a:schemeClr val="tx1"/>
+            </a:fontRef>
+          </p:style>
+        </p:cxnSp>
+        <p:cxnSp>
+          <p:nvCxnSpPr>
+            <p:cNvPr id="21" name="Straight Connector 10">
+              <a:extLst>
+                <a:ext uri="{FF2B5EF4-FFF2-40B4-BE49-F238E27FC236}">
+                  <a16:creationId xmlns:a16="http://schemas.microsoft.com/office/drawing/2014/main" id="{355E970F-F44C-4642-AEFE-E66102CB8019}"/>
+                </a:ext>
+              </a:extLst>
+            </p:cNvPr>
+            <p:cNvCxnSpPr>
+              <a:cxnSpLocks/>
+              <a:stCxn id="16" idx="1"/>
+              <a:endCxn id="19" idx="3"/>
+            </p:cNvCxnSpPr>
+            <p:nvPr/>
+          </p:nvCxnSpPr>
+          <p:spPr>
+            <a:xfrm flipV="1">
+              <a:off x="4186575" y="2827989"/>
+              <a:ext cx="752389" cy="8832"/>
+            </a:xfrm>
+            <a:prstGeom prst="bentConnector3">
+              <a:avLst>
+                <a:gd name="adj1" fmla="val 50000"/>
+              </a:avLst>
+            </a:prstGeom>
+            <a:ln w="19050"/>
+          </p:spPr>
+          <p:style>
+            <a:lnRef idx="1">
+              <a:schemeClr val="accent1"/>
+            </a:lnRef>
+            <a:fillRef idx="0">
+              <a:schemeClr val="accent1"/>
+            </a:fillRef>
+            <a:effectRef idx="0">
+              <a:schemeClr val="accent1"/>
+            </a:effectRef>
+            <a:fontRef idx="minor">
+              <a:schemeClr val="tx1"/>
+            </a:fontRef>
+          </p:style>
+        </p:cxnSp>
+        <p:cxnSp>
+          <p:nvCxnSpPr>
+            <p:cNvPr id="22" name="Straight Connector 10">
+              <a:extLst>
+                <a:ext uri="{FF2B5EF4-FFF2-40B4-BE49-F238E27FC236}">
+                  <a16:creationId xmlns:a16="http://schemas.microsoft.com/office/drawing/2014/main" id="{FBD6E505-9FBC-4B80-AF3F-CC616A679AFD}"/>
+                </a:ext>
+              </a:extLst>
+            </p:cNvPr>
+            <p:cNvCxnSpPr>
+              <a:cxnSpLocks/>
+              <a:stCxn id="14" idx="1"/>
+              <a:endCxn id="19" idx="3"/>
+            </p:cNvCxnSpPr>
+            <p:nvPr/>
+          </p:nvCxnSpPr>
+          <p:spPr>
+            <a:xfrm flipV="1">
+              <a:off x="4168284" y="2827989"/>
+              <a:ext cx="770680" cy="621679"/>
+            </a:xfrm>
+            <a:prstGeom prst="bentConnector3">
+              <a:avLst>
+                <a:gd name="adj1" fmla="val 50000"/>
+              </a:avLst>
+            </a:prstGeom>
+            <a:ln w="19050"/>
+          </p:spPr>
+          <p:style>
+            <a:lnRef idx="1">
+              <a:schemeClr val="accent1"/>
+            </a:lnRef>
+            <a:fillRef idx="0">
+              <a:schemeClr val="accent1"/>
+            </a:fillRef>
+            <a:effectRef idx="0">
+              <a:schemeClr val="accent1"/>
+            </a:effectRef>
+            <a:fontRef idx="minor">
+              <a:schemeClr val="tx1"/>
+            </a:fontRef>
+          </p:style>
+        </p:cxnSp>
+        <p:cxnSp>
+          <p:nvCxnSpPr>
+            <p:cNvPr id="15" name="Straight Connector 10">
+              <a:extLst>
+                <a:ext uri="{FF2B5EF4-FFF2-40B4-BE49-F238E27FC236}">
+                  <a16:creationId xmlns:a16="http://schemas.microsoft.com/office/drawing/2014/main" id="{F371313B-AB96-4A5E-B119-482DB436A818}"/>
+                </a:ext>
+              </a:extLst>
+            </p:cNvPr>
+            <p:cNvCxnSpPr>
+              <a:cxnSpLocks/>
+              <a:stCxn id="4" idx="1"/>
+              <a:endCxn id="2" idx="3"/>
+            </p:cNvCxnSpPr>
+            <p:nvPr/>
+          </p:nvCxnSpPr>
+          <p:spPr>
+            <a:xfrm>
+              <a:off x="1423669" y="2824826"/>
+              <a:ext cx="646198" cy="624842"/>
+            </a:xfrm>
+            <a:prstGeom prst="bentConnector3">
+              <a:avLst>
+                <a:gd name="adj1" fmla="val 50000"/>
+              </a:avLst>
+            </a:prstGeom>
+            <a:ln w="19050"/>
+          </p:spPr>
+          <p:style>
+            <a:lnRef idx="1">
+              <a:schemeClr val="accent1"/>
+            </a:lnRef>
+            <a:fillRef idx="0">
+              <a:schemeClr val="accent1"/>
+            </a:fillRef>
+            <a:effectRef idx="0">
+              <a:schemeClr val="accent1"/>
+            </a:effectRef>
+            <a:fontRef idx="minor">
+              <a:schemeClr val="tx1"/>
+            </a:fontRef>
+          </p:style>
+        </p:cxnSp>
         <p:sp>
           <p:nvSpPr>
             <p:cNvPr id="6" name="Isosceles Triangle 102">
@@ -5135,9 +5808,9 @@
             <p:nvPr/>
           </p:nvSpPr>
           <p:spPr>
-            <a:xfrm rot="5400000" flipH="1">
-              <a:off x="4640908" y="2728279"/>
-              <a:ext cx="270504" cy="179099"/>
+            <a:xfrm rot="16200000" flipH="1">
+              <a:off x="1400312" y="2777364"/>
+              <a:ext cx="141634" cy="94923"/>
             </a:xfrm>
             <a:prstGeom prst="triangle">
               <a:avLst/>
@@ -5175,30 +5848,29 @@
         </p:sp>
         <p:cxnSp>
           <p:nvCxnSpPr>
-            <p:cNvPr id="11" name="Straight Connector 10">
+            <p:cNvPr id="50" name="Straight Arrow Connector 49">
               <a:extLst>
                 <a:ext uri="{FF2B5EF4-FFF2-40B4-BE49-F238E27FC236}">
-                  <a16:creationId xmlns:a16="http://schemas.microsoft.com/office/drawing/2014/main" id="{3921B34D-4A5C-4B92-BB8F-57495445DE15}"/>
+                  <a16:creationId xmlns:a16="http://schemas.microsoft.com/office/drawing/2014/main" id="{5A0AD3AE-81B8-4D23-BEFF-DD9E363DF329}"/>
                 </a:ext>
               </a:extLst>
             </p:cNvPr>
             <p:cNvCxnSpPr>
-              <a:stCxn id="5" idx="1"/>
-              <a:endCxn id="6" idx="3"/>
+              <a:cxnSpLocks/>
             </p:cNvCxnSpPr>
             <p:nvPr/>
           </p:nvCxnSpPr>
           <p:spPr>
             <a:xfrm>
-              <a:off x="3323108" y="1636053"/>
-              <a:ext cx="1363503" cy="1181776"/>
+              <a:off x="2781093" y="2223974"/>
+              <a:ext cx="619221" cy="0"/>
             </a:xfrm>
-            <a:prstGeom prst="bentConnector3">
-              <a:avLst>
-                <a:gd name="adj1" fmla="val 50000"/>
-              </a:avLst>
+            <a:prstGeom prst="straightConnector1">
+              <a:avLst/>
             </a:prstGeom>
-            <a:ln w="19050"/>
+            <a:ln w="19050">
+              <a:tailEnd type="triangle"/>
+            </a:ln>
           </p:spPr>
           <p:style>
             <a:lnRef idx="1">
@@ -5217,31 +5889,29 @@
         </p:cxnSp>
         <p:cxnSp>
           <p:nvCxnSpPr>
-            <p:cNvPr id="12" name="Straight Connector 10">
+            <p:cNvPr id="51" name="Straight Arrow Connector 50">
               <a:extLst>
                 <a:ext uri="{FF2B5EF4-FFF2-40B4-BE49-F238E27FC236}">
-                  <a16:creationId xmlns:a16="http://schemas.microsoft.com/office/drawing/2014/main" id="{FAA039DF-F584-4EE8-A3AB-30481A79C857}"/>
+                  <a16:creationId xmlns:a16="http://schemas.microsoft.com/office/drawing/2014/main" id="{DE9EE1D2-4352-46C6-81E4-A3B9B60CAD6B}"/>
                 </a:ext>
               </a:extLst>
             </p:cNvPr>
             <p:cNvCxnSpPr>
               <a:cxnSpLocks/>
-              <a:stCxn id="3" idx="1"/>
-              <a:endCxn id="6" idx="3"/>
             </p:cNvCxnSpPr>
             <p:nvPr/>
           </p:nvCxnSpPr>
           <p:spPr>
             <a:xfrm>
-              <a:off x="3323108" y="2817829"/>
-              <a:ext cx="1363503" cy="12700"/>
+              <a:off x="2781093" y="2842742"/>
+              <a:ext cx="620530" cy="5921"/>
             </a:xfrm>
-            <a:prstGeom prst="bentConnector3">
-              <a:avLst>
-                <a:gd name="adj1" fmla="val 50000"/>
-              </a:avLst>
+            <a:prstGeom prst="straightConnector1">
+              <a:avLst/>
             </a:prstGeom>
-            <a:ln w="19050"/>
+            <a:ln w="19050">
+              <a:tailEnd type="triangle"/>
+            </a:ln>
           </p:spPr>
           <p:style>
             <a:lnRef idx="1">
@@ -5260,31 +5930,29 @@
         </p:cxnSp>
         <p:cxnSp>
           <p:nvCxnSpPr>
-            <p:cNvPr id="15" name="Straight Connector 10">
+            <p:cNvPr id="54" name="Straight Arrow Connector 53">
               <a:extLst>
                 <a:ext uri="{FF2B5EF4-FFF2-40B4-BE49-F238E27FC236}">
-                  <a16:creationId xmlns:a16="http://schemas.microsoft.com/office/drawing/2014/main" id="{F371313B-AB96-4A5E-B119-482DB436A818}"/>
+                  <a16:creationId xmlns:a16="http://schemas.microsoft.com/office/drawing/2014/main" id="{883A85DF-2749-49C9-A442-60E32049E044}"/>
                 </a:ext>
               </a:extLst>
             </p:cNvPr>
             <p:cNvCxnSpPr>
               <a:cxnSpLocks/>
-              <a:stCxn id="2" idx="1"/>
-              <a:endCxn id="6" idx="3"/>
             </p:cNvCxnSpPr>
             <p:nvPr/>
           </p:nvCxnSpPr>
           <p:spPr>
-            <a:xfrm flipV="1">
-              <a:off x="3323108" y="2817829"/>
-              <a:ext cx="1363503" cy="1181776"/>
+            <a:xfrm>
+              <a:off x="2781093" y="3461510"/>
+              <a:ext cx="619220" cy="0"/>
             </a:xfrm>
-            <a:prstGeom prst="bentConnector3">
-              <a:avLst>
-                <a:gd name="adj1" fmla="val 50000"/>
-              </a:avLst>
+            <a:prstGeom prst="straightConnector1">
+              <a:avLst/>
             </a:prstGeom>
-            <a:ln w="19050"/>
+            <a:ln w="19050">
+              <a:tailEnd type="triangle"/>
+            </a:ln>
           </p:spPr>
           <p:style>
             <a:lnRef idx="1">
@@ -5337,7 +6005,7 @@
           <p:cNvPr id="10" name="Group 9">
             <a:extLst>
               <a:ext uri="{FF2B5EF4-FFF2-40B4-BE49-F238E27FC236}">
-                <a16:creationId xmlns:a16="http://schemas.microsoft.com/office/drawing/2014/main" id="{B63996F5-E6CD-4397-82F2-985688E4C6EA}"/>
+                <a16:creationId xmlns:a16="http://schemas.microsoft.com/office/drawing/2014/main" id="{D13528B1-FD5B-4189-BCA6-1719C9EFDB96}"/>
               </a:ext>
             </a:extLst>
           </p:cNvPr>
@@ -5346,10 +6014,10 @@
         </p:nvGrpSpPr>
         <p:grpSpPr>
           <a:xfrm>
-            <a:off x="1981200" y="1169538"/>
-            <a:ext cx="2971800" cy="1954662"/>
-            <a:chOff x="1951508" y="1169538"/>
-            <a:chExt cx="4267220" cy="3296582"/>
+            <a:off x="1960536" y="1169538"/>
+            <a:ext cx="2535263" cy="1497462"/>
+            <a:chOff x="1960536" y="1169538"/>
+            <a:chExt cx="2535263" cy="1497462"/>
           </a:xfrm>
         </p:grpSpPr>
         <p:sp>
@@ -5366,8 +6034,8 @@
           </p:nvSpPr>
           <p:spPr>
             <a:xfrm flipH="1">
-              <a:off x="1981179" y="3533090"/>
-              <a:ext cx="1341929" cy="933030"/>
+              <a:off x="1977517" y="2243174"/>
+              <a:ext cx="767971" cy="423826"/>
             </a:xfrm>
             <a:prstGeom prst="rect">
               <a:avLst/>
@@ -5401,14 +6069,14 @@
             <a:p>
               <a:pPr algn="ctr"/>
               <a:r>
-                <a:rPr lang="en-US" sz="1050" b="1" dirty="0" err="1">
+                <a:rPr lang="en-US" sz="900" b="1" dirty="0" err="1">
                   <a:solidFill>
                     <a:schemeClr val="tx1"/>
                   </a:solidFill>
                 </a:rPr>
                 <a:t>SummaryBy</a:t>
               </a:r>
-              <a:endParaRPr lang="en-US" sz="1050" b="1" dirty="0">
+              <a:endParaRPr lang="en-US" sz="900" b="1" dirty="0">
                 <a:solidFill>
                   <a:schemeClr val="tx1"/>
                 </a:solidFill>
@@ -5417,7 +6085,7 @@
             <a:p>
               <a:pPr algn="ctr"/>
               <a:r>
-                <a:rPr lang="en-US" sz="1050" b="1" dirty="0">
+                <a:rPr lang="en-US" sz="900" b="1" dirty="0">
                   <a:solidFill>
                     <a:schemeClr val="tx1"/>
                   </a:solidFill>
@@ -5428,14 +6096,14 @@
             <a:p>
               <a:pPr algn="ctr"/>
               <a:r>
-                <a:rPr lang="en-US" sz="1050" b="1" dirty="0">
+                <a:rPr lang="en-US" sz="900" b="1" dirty="0">
                   <a:solidFill>
                     <a:schemeClr val="tx1"/>
                   </a:solidFill>
                 </a:rPr>
                 <a:t>List</a:t>
               </a:r>
-              <a:endParaRPr lang="en-SG" sz="1050" b="1" dirty="0">
+              <a:endParaRPr lang="en-SG" sz="900" b="1" dirty="0">
                 <a:solidFill>
                   <a:schemeClr val="tx1"/>
                 </a:solidFill>
@@ -5457,8 +6125,8 @@
           </p:nvSpPr>
           <p:spPr>
             <a:xfrm flipH="1">
-              <a:off x="1951508" y="2351314"/>
-              <a:ext cx="1371600" cy="933030"/>
+              <a:off x="1960536" y="1706356"/>
+              <a:ext cx="784952" cy="423826"/>
             </a:xfrm>
             <a:prstGeom prst="rect">
               <a:avLst/>
@@ -5492,14 +6160,14 @@
             <a:p>
               <a:pPr algn="ctr"/>
               <a:r>
-                <a:rPr lang="en-US" sz="1050" b="1" dirty="0" err="1">
+                <a:rPr lang="en-US" sz="900" b="1" dirty="0" err="1">
                   <a:solidFill>
                     <a:schemeClr val="tx1"/>
                   </a:solidFill>
                 </a:rPr>
                 <a:t>SummaryByMonth</a:t>
               </a:r>
-              <a:endParaRPr lang="en-US" sz="1050" b="1" dirty="0">
+              <a:endParaRPr lang="en-US" sz="900" b="1" dirty="0">
                 <a:solidFill>
                   <a:schemeClr val="tx1"/>
                 </a:solidFill>
@@ -5508,14 +6176,14 @@
             <a:p>
               <a:pPr algn="ctr"/>
               <a:r>
-                <a:rPr lang="en-US" sz="1050" b="1" dirty="0">
+                <a:rPr lang="en-US" sz="900" b="1" dirty="0">
                   <a:solidFill>
                     <a:schemeClr val="tx1"/>
                   </a:solidFill>
                 </a:rPr>
                 <a:t>List</a:t>
               </a:r>
-              <a:endParaRPr lang="en-SG" sz="1050" b="1" dirty="0">
+              <a:endParaRPr lang="en-SG" sz="900" b="1" dirty="0">
                 <a:solidFill>
                   <a:schemeClr val="tx1"/>
                 </a:solidFill>
@@ -5537,8 +6205,8 @@
           </p:nvSpPr>
           <p:spPr>
             <a:xfrm flipH="1">
-              <a:off x="4876800" y="2351314"/>
-              <a:ext cx="1341928" cy="933030"/>
+              <a:off x="3651628" y="1706356"/>
+              <a:ext cx="844171" cy="423826"/>
             </a:xfrm>
             <a:prstGeom prst="rect">
               <a:avLst/>
@@ -5572,7 +6240,7 @@
             <a:p>
               <a:pPr algn="ctr"/>
               <a:r>
-                <a:rPr lang="en-US" sz="1050" b="1" dirty="0">
+                <a:rPr lang="en-US" sz="900" b="1" dirty="0">
                   <a:solidFill>
                     <a:schemeClr val="tx1"/>
                   </a:solidFill>
@@ -5583,14 +6251,14 @@
             <a:p>
               <a:pPr algn="ctr"/>
               <a:r>
-                <a:rPr lang="en-US" sz="1050" b="1" dirty="0" err="1">
+                <a:rPr lang="en-US" sz="900" b="1" dirty="0" err="1">
                   <a:solidFill>
                     <a:schemeClr val="tx1"/>
                   </a:solidFill>
                 </a:rPr>
                 <a:t>SummaryList</a:t>
               </a:r>
-              <a:endParaRPr lang="en-SG" sz="1050" b="1" dirty="0">
+              <a:endParaRPr lang="en-SG" sz="900" b="1" dirty="0">
                 <a:solidFill>
                   <a:schemeClr val="tx1"/>
                 </a:solidFill>
@@ -5612,8 +6280,8 @@
           </p:nvSpPr>
           <p:spPr>
             <a:xfrm flipH="1">
-              <a:off x="1951508" y="1169538"/>
-              <a:ext cx="1371600" cy="933030"/>
+              <a:off x="1960536" y="1169538"/>
+              <a:ext cx="784952" cy="423826"/>
             </a:xfrm>
             <a:prstGeom prst="rect">
               <a:avLst/>
@@ -5647,14 +6315,14 @@
             <a:p>
               <a:pPr algn="ctr"/>
               <a:r>
-                <a:rPr lang="en-US" sz="1050" b="1" dirty="0" err="1">
+                <a:rPr lang="en-US" sz="900" b="1" dirty="0" err="1">
                   <a:solidFill>
                     <a:schemeClr val="tx1"/>
                   </a:solidFill>
                 </a:rPr>
                 <a:t>SummaryBy</a:t>
               </a:r>
-              <a:endParaRPr lang="en-US" sz="1050" b="1" dirty="0">
+              <a:endParaRPr lang="en-US" sz="900" b="1" dirty="0">
                 <a:solidFill>
                   <a:schemeClr val="tx1"/>
                 </a:solidFill>
@@ -5663,7 +6331,7 @@
             <a:p>
               <a:pPr algn="ctr"/>
               <a:r>
-                <a:rPr lang="en-US" sz="1050" b="1" dirty="0">
+                <a:rPr lang="en-US" sz="900" b="1" dirty="0">
                   <a:solidFill>
                     <a:schemeClr val="tx1"/>
                   </a:solidFill>
@@ -5674,14 +6342,14 @@
             <a:p>
               <a:pPr algn="ctr"/>
               <a:r>
-                <a:rPr lang="en-US" sz="1050" b="1" dirty="0">
+                <a:rPr lang="en-US" sz="900" b="1" dirty="0">
                   <a:solidFill>
                     <a:schemeClr val="tx1"/>
                   </a:solidFill>
                 </a:rPr>
                 <a:t>List</a:t>
               </a:r>
-              <a:endParaRPr lang="en-SG" sz="1050" b="1" dirty="0">
+              <a:endParaRPr lang="en-SG" sz="900" b="1" dirty="0">
                 <a:solidFill>
                   <a:schemeClr val="tx1"/>
                 </a:solidFill>
@@ -5703,8 +6371,8 @@
           </p:nvSpPr>
           <p:spPr>
             <a:xfrm rot="5400000" flipH="1">
-              <a:off x="4640908" y="2728279"/>
-              <a:ext cx="270504" cy="179099"/>
+              <a:off x="3532596" y="1867021"/>
+              <a:ext cx="122876" cy="102496"/>
             </a:xfrm>
             <a:prstGeom prst="triangle">
               <a:avLst/>
@@ -5763,8 +6431,8 @@
           </p:nvCxnSpPr>
           <p:spPr>
             <a:xfrm>
-              <a:off x="3323108" y="1636053"/>
-              <a:ext cx="1363503" cy="1181776"/>
+              <a:off x="2745488" y="1381451"/>
+              <a:ext cx="797299" cy="536818"/>
             </a:xfrm>
             <a:prstGeom prst="bentConnector3">
               <a:avLst>
@@ -5806,8 +6474,8 @@
           </p:nvCxnSpPr>
           <p:spPr>
             <a:xfrm>
-              <a:off x="3323108" y="2817829"/>
-              <a:ext cx="1363503" cy="12700"/>
+              <a:off x="2745488" y="1918269"/>
+              <a:ext cx="797299" cy="5769"/>
             </a:xfrm>
             <a:prstGeom prst="bentConnector3">
               <a:avLst>
@@ -5849,8 +6517,8 @@
           </p:nvCxnSpPr>
           <p:spPr>
             <a:xfrm flipV="1">
-              <a:off x="3323108" y="2817829"/>
-              <a:ext cx="1363503" cy="1181776"/>
+              <a:off x="2745488" y="1918269"/>
+              <a:ext cx="797299" cy="536818"/>
             </a:xfrm>
             <a:prstGeom prst="bentConnector3">
               <a:avLst>

</xml_diff>